<commit_message>
:pencil: auth model updates
</commit_message>
<xml_diff>
--- a/Platform/DE.OpenSource/Open Source platform Canvases.pptx
+++ b/Platform/DE.OpenSource/Open Source platform Canvases.pptx
@@ -212,7 +212,7 @@
 <file path=ppt/revisionInfo.xml><?xml version="1.0" encoding="utf-8"?>
 <p1510:revInfo xmlns:a="http://schemas.openxmlformats.org/drawingml/2006/main" xmlns:r="http://schemas.openxmlformats.org/officeDocument/2006/relationships" xmlns:p1510="http://schemas.microsoft.com/office/powerpoint/2015/10/main">
   <p1510:revLst>
-    <p1510:client id="{806E50F0-122F-43CC-B94A-8661E285D05C}" v="1479" dt="2018-08-03T14:05:02.544"/>
+    <p1510:client id="{806E50F0-122F-43CC-B94A-8661E285D05C}" v="1916" dt="2018-08-06T13:36:01.376"/>
   </p1510:revLst>
 </p1510:revInfo>
 </file>
@@ -222,7 +222,7 @@
   <pc:docChgLst>
     <pc:chgData name="Stevens, David" userId="73fe415a-d21a-4898-bfab-0e75d37181d7" providerId="ADAL" clId="{806E50F0-122F-43CC-B94A-8661E285D05C}"/>
     <pc:docChg chg="undo custSel addSld delSld modSld modMainMaster">
-      <pc:chgData name="Stevens, David" userId="73fe415a-d21a-4898-bfab-0e75d37181d7" providerId="ADAL" clId="{806E50F0-122F-43CC-B94A-8661E285D05C}" dt="2018-08-03T14:05:02.544" v="1441" actId="2696"/>
+      <pc:chgData name="Stevens, David" userId="73fe415a-d21a-4898-bfab-0e75d37181d7" providerId="ADAL" clId="{806E50F0-122F-43CC-B94A-8661E285D05C}" dt="2018-08-06T13:36:01.376" v="1878" actId="1076"/>
       <pc:docMkLst>
         <pc:docMk/>
       </pc:docMkLst>
@@ -369,7 +369,7 @@
         </pc:spChg>
       </pc:sldChg>
       <pc:sldChg chg="addSp modSp modNotesTx">
-        <pc:chgData name="Stevens, David" userId="73fe415a-d21a-4898-bfab-0e75d37181d7" providerId="ADAL" clId="{806E50F0-122F-43CC-B94A-8661E285D05C}" dt="2018-08-03T13:50:42.247" v="1218" actId="20577"/>
+        <pc:chgData name="Stevens, David" userId="73fe415a-d21a-4898-bfab-0e75d37181d7" providerId="ADAL" clId="{806E50F0-122F-43CC-B94A-8661E285D05C}" dt="2018-08-06T13:34:58.760" v="1864" actId="1076"/>
         <pc:sldMkLst>
           <pc:docMk/>
           <pc:sldMk cId="3441288266" sldId="260"/>
@@ -399,7 +399,7 @@
           </ac:spMkLst>
         </pc:spChg>
         <pc:spChg chg="add mod">
-          <ac:chgData name="Stevens, David" userId="73fe415a-d21a-4898-bfab-0e75d37181d7" providerId="ADAL" clId="{806E50F0-122F-43CC-B94A-8661E285D05C}" dt="2018-08-03T13:42:34.174" v="1079" actId="1076"/>
+          <ac:chgData name="Stevens, David" userId="73fe415a-d21a-4898-bfab-0e75d37181d7" providerId="ADAL" clId="{806E50F0-122F-43CC-B94A-8661E285D05C}" dt="2018-08-06T13:34:21.225" v="1816" actId="14100"/>
           <ac:spMkLst>
             <pc:docMk/>
             <pc:sldMk cId="3441288266" sldId="260"/>
@@ -438,9 +438,41 @@
             <ac:spMk id="31" creationId="{5F9119DD-E1DF-4D7A-9E37-F93C775EE097}"/>
           </ac:spMkLst>
         </pc:spChg>
+        <pc:spChg chg="add mod">
+          <ac:chgData name="Stevens, David" userId="73fe415a-d21a-4898-bfab-0e75d37181d7" providerId="ADAL" clId="{806E50F0-122F-43CC-B94A-8661E285D05C}" dt="2018-08-06T12:59:14.625" v="1775" actId="404"/>
+          <ac:spMkLst>
+            <pc:docMk/>
+            <pc:sldMk cId="3441288266" sldId="260"/>
+            <ac:spMk id="32" creationId="{8154332F-D9C1-4A07-8F63-C49B5C7A86BE}"/>
+          </ac:spMkLst>
+        </pc:spChg>
+        <pc:spChg chg="add mod">
+          <ac:chgData name="Stevens, David" userId="73fe415a-d21a-4898-bfab-0e75d37181d7" providerId="ADAL" clId="{806E50F0-122F-43CC-B94A-8661E285D05C}" dt="2018-08-06T12:59:59.153" v="1815" actId="1076"/>
+          <ac:spMkLst>
+            <pc:docMk/>
+            <pc:sldMk cId="3441288266" sldId="260"/>
+            <ac:spMk id="33" creationId="{2C03CB91-7B8B-49DC-B9C8-AB8EB62F73E6}"/>
+          </ac:spMkLst>
+        </pc:spChg>
+        <pc:spChg chg="add mod">
+          <ac:chgData name="Stevens, David" userId="73fe415a-d21a-4898-bfab-0e75d37181d7" providerId="ADAL" clId="{806E50F0-122F-43CC-B94A-8661E285D05C}" dt="2018-08-06T13:34:58.760" v="1864" actId="1076"/>
+          <ac:spMkLst>
+            <pc:docMk/>
+            <pc:sldMk cId="3441288266" sldId="260"/>
+            <ac:spMk id="34" creationId="{750445D6-D962-46E6-A569-F31547439D04}"/>
+          </ac:spMkLst>
+        </pc:spChg>
+        <pc:spChg chg="add mod">
+          <ac:chgData name="Stevens, David" userId="73fe415a-d21a-4898-bfab-0e75d37181d7" providerId="ADAL" clId="{806E50F0-122F-43CC-B94A-8661E285D05C}" dt="2018-08-06T13:34:44.681" v="1861" actId="1076"/>
+          <ac:spMkLst>
+            <pc:docMk/>
+            <pc:sldMk cId="3441288266" sldId="260"/>
+            <ac:spMk id="35" creationId="{92278AB6-94F9-4AF2-8EFF-B492CC67B4BE}"/>
+          </ac:spMkLst>
+        </pc:spChg>
       </pc:sldChg>
       <pc:sldChg chg="addSp delSp modSp modNotesTx">
-        <pc:chgData name="Stevens, David" userId="73fe415a-d21a-4898-bfab-0e75d37181d7" providerId="ADAL" clId="{806E50F0-122F-43CC-B94A-8661E285D05C}" dt="2018-08-03T13:51:44.166" v="1255" actId="1076"/>
+        <pc:chgData name="Stevens, David" userId="73fe415a-d21a-4898-bfab-0e75d37181d7" providerId="ADAL" clId="{806E50F0-122F-43CC-B94A-8661E285D05C}" dt="2018-08-06T10:51:37.682" v="1695" actId="1076"/>
         <pc:sldMkLst>
           <pc:docMk/>
           <pc:sldMk cId="3658207551" sldId="262"/>
@@ -454,7 +486,7 @@
           </ac:spMkLst>
         </pc:spChg>
         <pc:spChg chg="add mod">
-          <ac:chgData name="Stevens, David" userId="73fe415a-d21a-4898-bfab-0e75d37181d7" providerId="ADAL" clId="{806E50F0-122F-43CC-B94A-8661E285D05C}" dt="2018-08-03T10:44:59.975" v="110" actId="1076"/>
+          <ac:chgData name="Stevens, David" userId="73fe415a-d21a-4898-bfab-0e75d37181d7" providerId="ADAL" clId="{806E50F0-122F-43CC-B94A-8661E285D05C}" dt="2018-08-06T08:03:29.428" v="1547" actId="20577"/>
           <ac:spMkLst>
             <pc:docMk/>
             <pc:sldMk cId="3658207551" sldId="262"/>
@@ -542,7 +574,7 @@
           </ac:spMkLst>
         </pc:spChg>
         <pc:spChg chg="add mod">
-          <ac:chgData name="Stevens, David" userId="73fe415a-d21a-4898-bfab-0e75d37181d7" providerId="ADAL" clId="{806E50F0-122F-43CC-B94A-8661E285D05C}" dt="2018-08-03T13:51:23.430" v="1228" actId="1076"/>
+          <ac:chgData name="Stevens, David" userId="73fe415a-d21a-4898-bfab-0e75d37181d7" providerId="ADAL" clId="{806E50F0-122F-43CC-B94A-8661E285D05C}" dt="2018-08-06T08:03:05.492" v="1502" actId="20577"/>
           <ac:spMkLst>
             <pc:docMk/>
             <pc:sldMk cId="3658207551" sldId="262"/>
@@ -557,32 +589,33 @@
             <ac:spMk id="20" creationId="{B4917B1D-A103-48D3-9C8B-9E73B4D1F2E9}"/>
           </ac:spMkLst>
         </pc:spChg>
-      </pc:sldChg>
-      <pc:sldChg chg="addSp delSp modSp del modNotesTx">
-        <pc:chgData name="Stevens, David" userId="73fe415a-d21a-4898-bfab-0e75d37181d7" providerId="ADAL" clId="{806E50F0-122F-43CC-B94A-8661E285D05C}" dt="2018-08-03T12:54:09.665" v="829" actId="2696"/>
-        <pc:sldMkLst>
-          <pc:docMk/>
-          <pc:sldMk cId="1393938244" sldId="263"/>
-        </pc:sldMkLst>
-        <pc:spChg chg="add del mod">
-          <ac:chgData name="Stevens, David" userId="73fe415a-d21a-4898-bfab-0e75d37181d7" providerId="ADAL" clId="{806E50F0-122F-43CC-B94A-8661E285D05C}" dt="2018-08-03T12:17:45.275" v="319"/>
+        <pc:spChg chg="add mod">
+          <ac:chgData name="Stevens, David" userId="73fe415a-d21a-4898-bfab-0e75d37181d7" providerId="ADAL" clId="{806E50F0-122F-43CC-B94A-8661E285D05C}" dt="2018-08-06T08:03:00.572" v="1485" actId="1076"/>
           <ac:spMkLst>
             <pc:docMk/>
-            <pc:sldMk cId="1393938244" sldId="263"/>
-            <ac:spMk id="4" creationId="{8049114A-D706-485A-86DD-C378D2BFA9C1}"/>
+            <pc:sldMk cId="3658207551" sldId="262"/>
+            <ac:spMk id="21" creationId="{3993AAF0-E148-411E-9080-A913EED51D2D}"/>
           </ac:spMkLst>
         </pc:spChg>
-        <pc:spChg chg="add del mod">
-          <ac:chgData name="Stevens, David" userId="73fe415a-d21a-4898-bfab-0e75d37181d7" providerId="ADAL" clId="{806E50F0-122F-43CC-B94A-8661E285D05C}" dt="2018-08-03T12:17:45.275" v="319"/>
+        <pc:spChg chg="add mod">
+          <ac:chgData name="Stevens, David" userId="73fe415a-d21a-4898-bfab-0e75d37181d7" providerId="ADAL" clId="{806E50F0-122F-43CC-B94A-8661E285D05C}" dt="2018-08-06T08:03:23.796" v="1541" actId="1076"/>
           <ac:spMkLst>
             <pc:docMk/>
-            <pc:sldMk cId="1393938244" sldId="263"/>
-            <ac:spMk id="5" creationId="{9F338D1F-3A23-4E2E-9DC0-94DDFE507454}"/>
+            <pc:sldMk cId="3658207551" sldId="262"/>
+            <ac:spMk id="22" creationId="{66963F38-50F8-40EC-B8CB-B3D1AE9707FF}"/>
+          </ac:spMkLst>
+        </pc:spChg>
+        <pc:spChg chg="add mod">
+          <ac:chgData name="Stevens, David" userId="73fe415a-d21a-4898-bfab-0e75d37181d7" providerId="ADAL" clId="{806E50F0-122F-43CC-B94A-8661E285D05C}" dt="2018-08-06T10:51:37.682" v="1695" actId="1076"/>
+          <ac:spMkLst>
+            <pc:docMk/>
+            <pc:sldMk cId="3658207551" sldId="262"/>
+            <ac:spMk id="23" creationId="{ED64DD5C-E0DC-48E9-B4BB-CF8B61167294}"/>
           </ac:spMkLst>
         </pc:spChg>
       </pc:sldChg>
       <pc:sldChg chg="addSp delSp modSp modNotesTx">
-        <pc:chgData name="Stevens, David" userId="73fe415a-d21a-4898-bfab-0e75d37181d7" providerId="ADAL" clId="{806E50F0-122F-43CC-B94A-8661E285D05C}" dt="2018-08-03T14:05:01.447" v="1440" actId="1076"/>
+        <pc:chgData name="Stevens, David" userId="73fe415a-d21a-4898-bfab-0e75d37181d7" providerId="ADAL" clId="{806E50F0-122F-43CC-B94A-8661E285D05C}" dt="2018-08-06T13:36:01.376" v="1878" actId="1076"/>
         <pc:sldMkLst>
           <pc:docMk/>
           <pc:sldMk cId="1618476812" sldId="264"/>
@@ -603,8 +636,8 @@
             <ac:spMk id="5" creationId="{E8A04C7D-1D0A-473D-AF63-BF0F7AC6F0D1}"/>
           </ac:spMkLst>
         </pc:spChg>
-        <pc:spChg chg="add">
-          <ac:chgData name="Stevens, David" userId="73fe415a-d21a-4898-bfab-0e75d37181d7" providerId="ADAL" clId="{806E50F0-122F-43CC-B94A-8661E285D05C}" dt="2018-08-03T12:17:46.676" v="320"/>
+        <pc:spChg chg="add del">
+          <ac:chgData name="Stevens, David" userId="73fe415a-d21a-4898-bfab-0e75d37181d7" providerId="ADAL" clId="{806E50F0-122F-43CC-B94A-8661E285D05C}" dt="2018-08-06T13:35:53.457" v="1875" actId="478"/>
           <ac:spMkLst>
             <pc:docMk/>
             <pc:sldMk cId="1618476812" sldId="264"/>
@@ -715,85 +748,46 @@
             <ac:spMk id="20" creationId="{D2D45CB6-68DE-4A4A-9DF5-98965886EBFB}"/>
           </ac:spMkLst>
         </pc:spChg>
-      </pc:sldChg>
-      <pc:sldChg chg="addSp delSp modSp add del modNotesTx">
-        <pc:chgData name="Stevens, David" userId="73fe415a-d21a-4898-bfab-0e75d37181d7" providerId="ADAL" clId="{806E50F0-122F-43CC-B94A-8661E285D05C}" dt="2018-08-03T12:44:22.512" v="557" actId="2696"/>
-        <pc:sldMkLst>
-          <pc:docMk/>
-          <pc:sldMk cId="999467083" sldId="265"/>
-        </pc:sldMkLst>
-        <pc:spChg chg="add del mod">
-          <ac:chgData name="Stevens, David" userId="73fe415a-d21a-4898-bfab-0e75d37181d7" providerId="ADAL" clId="{806E50F0-122F-43CC-B94A-8661E285D05C}" dt="2018-08-03T12:36:49.882" v="426" actId="478"/>
+        <pc:spChg chg="add mod">
+          <ac:chgData name="Stevens, David" userId="73fe415a-d21a-4898-bfab-0e75d37181d7" providerId="ADAL" clId="{806E50F0-122F-43CC-B94A-8661E285D05C}" dt="2018-08-06T08:03:54.060" v="1589" actId="14100"/>
           <ac:spMkLst>
             <pc:docMk/>
-            <pc:sldMk cId="999467083" sldId="265"/>
-            <ac:spMk id="2" creationId="{61EEC001-5B64-4C81-9227-F34E781EBECD}"/>
-          </ac:spMkLst>
-        </pc:spChg>
-        <pc:spChg chg="add del mod">
-          <ac:chgData name="Stevens, David" userId="73fe415a-d21a-4898-bfab-0e75d37181d7" providerId="ADAL" clId="{806E50F0-122F-43CC-B94A-8661E285D05C}" dt="2018-08-03T12:38:33.602" v="452" actId="478"/>
-          <ac:spMkLst>
-            <pc:docMk/>
-            <pc:sldMk cId="999467083" sldId="265"/>
-            <ac:spMk id="3" creationId="{56C07721-D5CB-47CF-8C86-5B8CB711A465}"/>
-          </ac:spMkLst>
-        </pc:spChg>
-        <pc:spChg chg="add del mod">
-          <ac:chgData name="Stevens, David" userId="73fe415a-d21a-4898-bfab-0e75d37181d7" providerId="ADAL" clId="{806E50F0-122F-43CC-B94A-8661E285D05C}" dt="2018-08-03T12:39:19.426" v="468" actId="478"/>
-          <ac:spMkLst>
-            <pc:docMk/>
-            <pc:sldMk cId="999467083" sldId="265"/>
-            <ac:spMk id="4" creationId="{B81EC85C-7C40-446F-A084-D9BAA485D669}"/>
-          </ac:spMkLst>
-        </pc:spChg>
-        <pc:spChg chg="add del mod">
-          <ac:chgData name="Stevens, David" userId="73fe415a-d21a-4898-bfab-0e75d37181d7" providerId="ADAL" clId="{806E50F0-122F-43CC-B94A-8661E285D05C}" dt="2018-08-03T12:39:19.426" v="468" actId="478"/>
-          <ac:spMkLst>
-            <pc:docMk/>
-            <pc:sldMk cId="999467083" sldId="265"/>
-            <ac:spMk id="6" creationId="{E605E137-0A66-49B6-A2E7-541F048C4965}"/>
-          </ac:spMkLst>
-        </pc:spChg>
-        <pc:spChg chg="add del mod">
-          <ac:chgData name="Stevens, David" userId="73fe415a-d21a-4898-bfab-0e75d37181d7" providerId="ADAL" clId="{806E50F0-122F-43CC-B94A-8661E285D05C}" dt="2018-08-03T12:39:19.426" v="468" actId="478"/>
-          <ac:spMkLst>
-            <pc:docMk/>
-            <pc:sldMk cId="999467083" sldId="265"/>
-            <ac:spMk id="7" creationId="{BF6D17E1-5F01-4BB6-AD6A-25CBDB28A75B}"/>
-          </ac:spMkLst>
-        </pc:spChg>
-        <pc:spChg chg="add del mod">
-          <ac:chgData name="Stevens, David" userId="73fe415a-d21a-4898-bfab-0e75d37181d7" providerId="ADAL" clId="{806E50F0-122F-43CC-B94A-8661E285D05C}" dt="2018-08-03T12:39:14.754" v="465" actId="478"/>
-          <ac:spMkLst>
-            <pc:docMk/>
-            <pc:sldMk cId="999467083" sldId="265"/>
-            <ac:spMk id="8" creationId="{AEE6FEDA-1CB3-467E-9298-0193AE089904}"/>
+            <pc:sldMk cId="1618476812" sldId="264"/>
+            <ac:spMk id="21" creationId="{7954B1FE-E300-4BF4-AE6B-3A5719C447EA}"/>
           </ac:spMkLst>
         </pc:spChg>
         <pc:spChg chg="add mod">
-          <ac:chgData name="Stevens, David" userId="73fe415a-d21a-4898-bfab-0e75d37181d7" providerId="ADAL" clId="{806E50F0-122F-43CC-B94A-8661E285D05C}" dt="2018-08-03T12:38:28.875" v="450"/>
+          <ac:chgData name="Stevens, David" userId="73fe415a-d21a-4898-bfab-0e75d37181d7" providerId="ADAL" clId="{806E50F0-122F-43CC-B94A-8661E285D05C}" dt="2018-08-06T08:04:22.644" v="1611" actId="1076"/>
           <ac:spMkLst>
             <pc:docMk/>
-            <pc:sldMk cId="999467083" sldId="265"/>
-            <ac:spMk id="9" creationId="{04317ADB-0CFB-4368-88BC-882A1AFD0F13}"/>
+            <pc:sldMk cId="1618476812" sldId="264"/>
+            <ac:spMk id="22" creationId="{5F44AA67-71C2-4669-AC9D-B88878889D1A}"/>
           </ac:spMkLst>
         </pc:spChg>
-        <pc:spChg chg="add del mod">
-          <ac:chgData name="Stevens, David" userId="73fe415a-d21a-4898-bfab-0e75d37181d7" providerId="ADAL" clId="{806E50F0-122F-43CC-B94A-8661E285D05C}" dt="2018-08-03T12:39:13.689" v="464" actId="478"/>
+        <pc:spChg chg="add mod">
+          <ac:chgData name="Stevens, David" userId="73fe415a-d21a-4898-bfab-0e75d37181d7" providerId="ADAL" clId="{806E50F0-122F-43CC-B94A-8661E285D05C}" dt="2018-08-06T13:36:01.376" v="1878" actId="1076"/>
           <ac:spMkLst>
             <pc:docMk/>
-            <pc:sldMk cId="999467083" sldId="265"/>
-            <ac:spMk id="10" creationId="{6DF28AAC-ED59-4BF9-9BD7-A008FD219888}"/>
+            <pc:sldMk cId="1618476812" sldId="264"/>
+            <ac:spMk id="23" creationId="{E187CED8-26DC-422D-837F-D3D3329926DD}"/>
           </ac:spMkLst>
         </pc:spChg>
-        <pc:graphicFrameChg chg="add del mod modGraphic">
-          <ac:chgData name="Stevens, David" userId="73fe415a-d21a-4898-bfab-0e75d37181d7" providerId="ADAL" clId="{806E50F0-122F-43CC-B94A-8661E285D05C}" dt="2018-08-03T12:41:57.381" v="529" actId="121"/>
-          <ac:graphicFrameMkLst>
+        <pc:spChg chg="add mod">
+          <ac:chgData name="Stevens, David" userId="73fe415a-d21a-4898-bfab-0e75d37181d7" providerId="ADAL" clId="{806E50F0-122F-43CC-B94A-8661E285D05C}" dt="2018-08-06T10:51:05.202" v="1665" actId="1076"/>
+          <ac:spMkLst>
             <pc:docMk/>
-            <pc:sldMk cId="999467083" sldId="265"/>
-            <ac:graphicFrameMk id="5" creationId="{D3C648A4-904F-4AA9-B8C3-3E4B556284A4}"/>
-          </ac:graphicFrameMkLst>
-        </pc:graphicFrameChg>
+            <pc:sldMk cId="1618476812" sldId="264"/>
+            <ac:spMk id="24" creationId="{AD65A676-1E9E-44BB-9CCE-28570D4C2364}"/>
+          </ac:spMkLst>
+        </pc:spChg>
+        <pc:spChg chg="add mod">
+          <ac:chgData name="Stevens, David" userId="73fe415a-d21a-4898-bfab-0e75d37181d7" providerId="ADAL" clId="{806E50F0-122F-43CC-B94A-8661E285D05C}" dt="2018-08-06T13:35:48.064" v="1874" actId="1076"/>
+          <ac:spMkLst>
+            <pc:docMk/>
+            <pc:sldMk cId="1618476812" sldId="264"/>
+            <ac:spMk id="25" creationId="{6A9D518C-398B-4059-A2AF-2509B3C35B06}"/>
+          </ac:spMkLst>
+        </pc:spChg>
       </pc:sldChg>
       <pc:sldChg chg="addSp modSp add">
         <pc:chgData name="Stevens, David" userId="73fe415a-d21a-4898-bfab-0e75d37181d7" providerId="ADAL" clId="{806E50F0-122F-43CC-B94A-8661E285D05C}" dt="2018-08-03T12:57:06.987" v="981" actId="1076"/>
@@ -999,117 +993,6 @@
             <pc:docMk/>
             <pc:sldMk cId="3386378356" sldId="266"/>
             <ac:spMk id="26" creationId="{ADFBDDAD-58AE-4A95-835E-875CD82ECC45}"/>
-          </ac:spMkLst>
-        </pc:spChg>
-      </pc:sldChg>
-      <pc:sldChg chg="addSp delSp modSp add del">
-        <pc:chgData name="Stevens, David" userId="73fe415a-d21a-4898-bfab-0e75d37181d7" providerId="ADAL" clId="{806E50F0-122F-43CC-B94A-8661E285D05C}" dt="2018-08-03T14:05:02.544" v="1441" actId="2696"/>
-        <pc:sldMkLst>
-          <pc:docMk/>
-          <pc:sldMk cId="2332212255" sldId="267"/>
-        </pc:sldMkLst>
-        <pc:spChg chg="del">
-          <ac:chgData name="Stevens, David" userId="73fe415a-d21a-4898-bfab-0e75d37181d7" providerId="ADAL" clId="{806E50F0-122F-43CC-B94A-8661E285D05C}" dt="2018-08-03T14:03:13.655" v="1258" actId="478"/>
-          <ac:spMkLst>
-            <pc:docMk/>
-            <pc:sldMk cId="2332212255" sldId="267"/>
-            <ac:spMk id="4" creationId="{2D68A5F4-435F-4BD6-B748-5239B25875BB}"/>
-          </ac:spMkLst>
-        </pc:spChg>
-        <pc:spChg chg="del">
-          <ac:chgData name="Stevens, David" userId="73fe415a-d21a-4898-bfab-0e75d37181d7" providerId="ADAL" clId="{806E50F0-122F-43CC-B94A-8661E285D05C}" dt="2018-08-03T14:03:08.240" v="1257" actId="478"/>
-          <ac:spMkLst>
-            <pc:docMk/>
-            <pc:sldMk cId="2332212255" sldId="267"/>
-            <ac:spMk id="5" creationId="{E8A04C7D-1D0A-473D-AF63-BF0F7AC6F0D1}"/>
-          </ac:spMkLst>
-        </pc:spChg>
-        <pc:spChg chg="del">
-          <ac:chgData name="Stevens, David" userId="73fe415a-d21a-4898-bfab-0e75d37181d7" providerId="ADAL" clId="{806E50F0-122F-43CC-B94A-8661E285D05C}" dt="2018-08-03T14:03:08.240" v="1257" actId="478"/>
-          <ac:spMkLst>
-            <pc:docMk/>
-            <pc:sldMk cId="2332212255" sldId="267"/>
-            <ac:spMk id="6" creationId="{599D3244-0900-496F-95D5-C50B9DA3A026}"/>
-          </ac:spMkLst>
-        </pc:spChg>
-        <pc:spChg chg="del">
-          <ac:chgData name="Stevens, David" userId="73fe415a-d21a-4898-bfab-0e75d37181d7" providerId="ADAL" clId="{806E50F0-122F-43CC-B94A-8661E285D05C}" dt="2018-08-03T14:03:08.240" v="1257" actId="478"/>
-          <ac:spMkLst>
-            <pc:docMk/>
-            <pc:sldMk cId="2332212255" sldId="267"/>
-            <ac:spMk id="7" creationId="{9C067C5E-83B5-4AC4-A0AD-879B0876E185}"/>
-          </ac:spMkLst>
-        </pc:spChg>
-        <pc:spChg chg="del">
-          <ac:chgData name="Stevens, David" userId="73fe415a-d21a-4898-bfab-0e75d37181d7" providerId="ADAL" clId="{806E50F0-122F-43CC-B94A-8661E285D05C}" dt="2018-08-03T14:03:08.240" v="1257" actId="478"/>
-          <ac:spMkLst>
-            <pc:docMk/>
-            <pc:sldMk cId="2332212255" sldId="267"/>
-            <ac:spMk id="8" creationId="{918E43F6-0DB7-4BFE-B744-ACD622615D3B}"/>
-          </ac:spMkLst>
-        </pc:spChg>
-        <pc:spChg chg="del">
-          <ac:chgData name="Stevens, David" userId="73fe415a-d21a-4898-bfab-0e75d37181d7" providerId="ADAL" clId="{806E50F0-122F-43CC-B94A-8661E285D05C}" dt="2018-08-03T14:03:08.240" v="1257" actId="478"/>
-          <ac:spMkLst>
-            <pc:docMk/>
-            <pc:sldMk cId="2332212255" sldId="267"/>
-            <ac:spMk id="9" creationId="{3A8E1611-99C0-477A-B2BB-4558F7110090}"/>
-          </ac:spMkLst>
-        </pc:spChg>
-        <pc:spChg chg="add del mod">
-          <ac:chgData name="Stevens, David" userId="73fe415a-d21a-4898-bfab-0e75d37181d7" providerId="ADAL" clId="{806E50F0-122F-43CC-B94A-8661E285D05C}" dt="2018-08-03T14:04:47.818" v="1434"/>
-          <ac:spMkLst>
-            <pc:docMk/>
-            <pc:sldMk cId="2332212255" sldId="267"/>
-            <ac:spMk id="10" creationId="{6594D03F-041E-4207-8651-10F3B7903C5B}"/>
-          </ac:spMkLst>
-        </pc:spChg>
-        <pc:spChg chg="add mod">
-          <ac:chgData name="Stevens, David" userId="73fe415a-d21a-4898-bfab-0e75d37181d7" providerId="ADAL" clId="{806E50F0-122F-43CC-B94A-8661E285D05C}" dt="2018-08-03T14:03:33.623" v="1306" actId="14100"/>
-          <ac:spMkLst>
-            <pc:docMk/>
-            <pc:sldMk cId="2332212255" sldId="267"/>
-            <ac:spMk id="11" creationId="{69ACFE84-E368-4FC8-B482-34E5D4BCB3B1}"/>
-          </ac:spMkLst>
-        </pc:spChg>
-        <pc:spChg chg="add mod">
-          <ac:chgData name="Stevens, David" userId="73fe415a-d21a-4898-bfab-0e75d37181d7" providerId="ADAL" clId="{806E50F0-122F-43CC-B94A-8661E285D05C}" dt="2018-08-03T14:03:42.576" v="1335" actId="20577"/>
-          <ac:spMkLst>
-            <pc:docMk/>
-            <pc:sldMk cId="2332212255" sldId="267"/>
-            <ac:spMk id="12" creationId="{BB4EDD2B-CC4E-422E-BE14-DA10D7A410EF}"/>
-          </ac:spMkLst>
-        </pc:spChg>
-        <pc:spChg chg="add mod">
-          <ac:chgData name="Stevens, David" userId="73fe415a-d21a-4898-bfab-0e75d37181d7" providerId="ADAL" clId="{806E50F0-122F-43CC-B94A-8661E285D05C}" dt="2018-08-03T14:03:52.591" v="1369" actId="1076"/>
-          <ac:spMkLst>
-            <pc:docMk/>
-            <pc:sldMk cId="2332212255" sldId="267"/>
-            <ac:spMk id="13" creationId="{24393177-9CA2-40BD-8A1F-57962116FD1D}"/>
-          </ac:spMkLst>
-        </pc:spChg>
-        <pc:spChg chg="add mod">
-          <ac:chgData name="Stevens, David" userId="73fe415a-d21a-4898-bfab-0e75d37181d7" providerId="ADAL" clId="{806E50F0-122F-43CC-B94A-8661E285D05C}" dt="2018-08-03T14:04:02.144" v="1376" actId="6549"/>
-          <ac:spMkLst>
-            <pc:docMk/>
-            <pc:sldMk cId="2332212255" sldId="267"/>
-            <ac:spMk id="14" creationId="{06C87C73-0240-4219-9340-0CFD20A731EF}"/>
-          </ac:spMkLst>
-        </pc:spChg>
-        <pc:spChg chg="add mod">
-          <ac:chgData name="Stevens, David" userId="73fe415a-d21a-4898-bfab-0e75d37181d7" providerId="ADAL" clId="{806E50F0-122F-43CC-B94A-8661E285D05C}" dt="2018-08-03T14:04:13.727" v="1409" actId="20577"/>
-          <ac:spMkLst>
-            <pc:docMk/>
-            <pc:sldMk cId="2332212255" sldId="267"/>
-            <ac:spMk id="15" creationId="{6C12BE02-B92C-4A17-906A-65BFE61422CC}"/>
-          </ac:spMkLst>
-        </pc:spChg>
-        <pc:spChg chg="add mod">
-          <ac:chgData name="Stevens, David" userId="73fe415a-d21a-4898-bfab-0e75d37181d7" providerId="ADAL" clId="{806E50F0-122F-43CC-B94A-8661E285D05C}" dt="2018-08-03T14:04:20.903" v="1429" actId="20577"/>
-          <ac:spMkLst>
-            <pc:docMk/>
-            <pc:sldMk cId="2332212255" sldId="267"/>
-            <ac:spMk id="17" creationId="{DD0DABDB-D11A-4E06-AD68-DD882CBDC556}"/>
           </ac:spMkLst>
         </pc:spChg>
       </pc:sldChg>
@@ -1446,7 +1329,7 @@
                 <a:latin typeface="Arial"/>
                 <a:cs typeface="Arial"/>
               </a:rPr>
-              <a:t>8/3/2018</a:t>
+              <a:t>8/6/2018</a:t>
             </a:fld>
             <a:endParaRPr lang="en-US">
               <a:latin typeface="Arial"/>
@@ -1631,7 +1514,7 @@
             <a:fld id="{73B26A0F-F4D6-9B4F-A87B-D8948CDE3BB4}" type="datetimeFigureOut">
               <a:rPr lang="en-US" smtClean="0"/>
               <a:pPr/>
-              <a:t>8/3/2018</a:t>
+              <a:t>8/6/2018</a:t>
             </a:fld>
             <a:endParaRPr lang="en-US"/>
           </a:p>
@@ -4387,7 +4270,7 @@
                   <a:spcPts val="0"/>
                 </a:spcBef>
               </a:pPr>
-              <a:t>August 3, 2018</a:t>
+              <a:t>August 6, 2018</a:t>
             </a:fld>
             <a:endParaRPr lang="en-US" sz="1400" b="0" dirty="0">
               <a:solidFill>
@@ -9139,7 +9022,7 @@
                   <a:spcPct val="50000"/>
                 </a:spcBef>
               </a:pPr>
-              <a:t>August 3, 2018</a:t>
+              <a:t>August 6, 2018</a:t>
             </a:fld>
             <a:endParaRPr lang="en-US" sz="1100" b="0" dirty="0">
               <a:solidFill>
@@ -10904,7 +10787,7 @@
                   <a:spcPct val="50000"/>
                 </a:spcBef>
               </a:pPr>
-              <a:t>August 3, 2018</a:t>
+              <a:t>August 6, 2018</a:t>
             </a:fld>
             <a:endParaRPr lang="en-US" sz="1100" b="0" dirty="0">
               <a:solidFill>
@@ -12234,7 +12117,7 @@
                   <a:spcPts val="0"/>
                 </a:spcBef>
               </a:pPr>
-              <a:t>August 3, 2018</a:t>
+              <a:t>August 6, 2018</a:t>
             </a:fld>
             <a:endParaRPr lang="en-US" sz="1100" b="0" dirty="0">
               <a:solidFill>
@@ -13914,7 +13797,7 @@
                   <a:spcPts val="0"/>
                 </a:spcBef>
               </a:pPr>
-              <a:t>August 3, 2018</a:t>
+              <a:t>August 6, 2018</a:t>
             </a:fld>
             <a:endParaRPr lang="en-US" sz="1400" b="0" dirty="0">
               <a:solidFill>
@@ -15241,7 +15124,7 @@
                   <a:spcPct val="50000"/>
                 </a:spcBef>
               </a:pPr>
-              <a:t>August 3, 2018</a:t>
+              <a:t>August 6, 2018</a:t>
             </a:fld>
             <a:endParaRPr lang="en-US" sz="1100" b="0" dirty="0">
               <a:solidFill>
@@ -16605,7 +16488,7 @@
                   <a:spcPts val="0"/>
                 </a:spcBef>
               </a:pPr>
-              <a:t>August 3, 2018</a:t>
+              <a:t>August 6, 2018</a:t>
             </a:fld>
             <a:endParaRPr lang="en-US" sz="1100" b="0" dirty="0">
               <a:solidFill>
@@ -18042,7 +17925,7 @@
                   <a:spcPct val="50000"/>
                 </a:spcBef>
               </a:pPr>
-              <a:t>August 3, 2018</a:t>
+              <a:t>August 6, 2018</a:t>
             </a:fld>
             <a:endParaRPr lang="en-US" sz="1100" b="0" dirty="0">
               <a:solidFill>
@@ -22281,7 +22164,7 @@
                   <a:spcPts val="0"/>
                 </a:spcBef>
               </a:pPr>
-              <a:t>August 3, 2018</a:t>
+              <a:t>August 6, 2018</a:t>
             </a:fld>
             <a:endParaRPr lang="en-US" sz="1400" b="0" dirty="0">
               <a:solidFill>
@@ -23680,7 +23563,7 @@
                   <a:spcPts val="0"/>
                 </a:spcBef>
               </a:pPr>
-              <a:t>August 3, 2018</a:t>
+              <a:t>August 6, 2018</a:t>
             </a:fld>
             <a:endParaRPr lang="en-US" sz="1400" b="0" dirty="0">
               <a:solidFill>
@@ -25249,7 +25132,7 @@
                   <a:spcPts val="0"/>
                 </a:spcBef>
               </a:pPr>
-              <a:t>August 3, 2018</a:t>
+              <a:t>August 6, 2018</a:t>
             </a:fld>
             <a:endParaRPr lang="en-US" sz="1400" b="0" dirty="0">
               <a:solidFill>
@@ -26679,7 +26562,7 @@
                   <a:spcPts val="0"/>
                 </a:spcBef>
               </a:pPr>
-              <a:t>August 3, 2018</a:t>
+              <a:t>August 6, 2018</a:t>
             </a:fld>
             <a:endParaRPr lang="en-US" sz="1400" b="0" dirty="0">
               <a:solidFill>
@@ -28101,7 +27984,7 @@
                   <a:spcPts val="0"/>
                 </a:spcBef>
               </a:pPr>
-              <a:t>August 3, 2018</a:t>
+              <a:t>August 6, 2018</a:t>
             </a:fld>
             <a:endParaRPr lang="en-US" sz="1400" b="0" dirty="0">
               <a:solidFill>
@@ -29667,7 +29550,7 @@
                   <a:spcPts val="0"/>
                 </a:spcBef>
               </a:pPr>
-              <a:t>August 3, 2018</a:t>
+              <a:t>August 6, 2018</a:t>
             </a:fld>
             <a:endParaRPr lang="en-US" sz="1100" b="0" dirty="0">
               <a:solidFill>
@@ -34247,7 +34130,7 @@
         <p:spPr>
           <a:xfrm>
             <a:off x="2960494" y="1107419"/>
-            <a:ext cx="2156684" cy="649539"/>
+            <a:ext cx="1906434" cy="649539"/>
           </a:xfrm>
           <a:prstGeom prst="foldedCorner">
             <a:avLst>
@@ -34435,6 +34318,282 @@
                 </a:solidFill>
               </a:rPr>
               <a:t>Connect knowledge across their enterprise</a:t>
+            </a:r>
+          </a:p>
+        </p:txBody>
+      </p:sp>
+      <p:sp>
+        <p:nvSpPr>
+          <p:cNvPr id="32" name="Rectangle: Folded Corner 31">
+            <a:extLst>
+              <a:ext uri="{FF2B5EF4-FFF2-40B4-BE49-F238E27FC236}">
+                <a16:creationId xmlns:a16="http://schemas.microsoft.com/office/drawing/2014/main" id="{8154332F-D9C1-4A07-8F63-C49B5C7A86BE}"/>
+              </a:ext>
+            </a:extLst>
+          </p:cNvPr>
+          <p:cNvSpPr/>
+          <p:nvPr/>
+        </p:nvSpPr>
+        <p:spPr>
+          <a:xfrm>
+            <a:off x="12643792" y="4535518"/>
+            <a:ext cx="1512168" cy="1235466"/>
+          </a:xfrm>
+          <a:prstGeom prst="foldedCorner">
+            <a:avLst>
+              <a:gd name="adj" fmla="val 16116"/>
+            </a:avLst>
+          </a:prstGeom>
+          <a:solidFill>
+            <a:schemeClr val="accent3">
+              <a:lumMod val="20000"/>
+              <a:lumOff val="80000"/>
+            </a:schemeClr>
+          </a:solidFill>
+          <a:ln>
+            <a:solidFill>
+              <a:schemeClr val="tx1"/>
+            </a:solidFill>
+          </a:ln>
+        </p:spPr>
+        <p:style>
+          <a:lnRef idx="0">
+            <a:schemeClr val="accent1"/>
+          </a:lnRef>
+          <a:fillRef idx="1">
+            <a:schemeClr val="accent1"/>
+          </a:fillRef>
+          <a:effectRef idx="0">
+            <a:schemeClr val="accent1"/>
+          </a:effectRef>
+          <a:fontRef idx="minor">
+            <a:schemeClr val="lt1"/>
+          </a:fontRef>
+        </p:style>
+        <p:txBody>
+          <a:bodyPr rot="0" spcFirstLastPara="0" vertOverflow="overflow" horzOverflow="overflow" vert="horz" wrap="square" lIns="91440" tIns="108000" rIns="91440" bIns="0" numCol="1" spcCol="0" rtlCol="0" fromWordArt="0" anchor="ctr" anchorCtr="0" forceAA="0" compatLnSpc="1">
+            <a:prstTxWarp prst="textNoShape">
+              <a:avLst/>
+            </a:prstTxWarp>
+            <a:noAutofit/>
+          </a:bodyPr>
+          <a:lstStyle/>
+          <a:p>
+            <a:pPr algn="ctr"/>
+            <a:r>
+              <a:rPr lang="en-GB" sz="1400" dirty="0">
+                <a:solidFill>
+                  <a:schemeClr val="tx1"/>
+                </a:solidFill>
+              </a:rPr>
+              <a:t>Define new business analytics processes &amp; tools</a:t>
+            </a:r>
+          </a:p>
+        </p:txBody>
+      </p:sp>
+      <p:sp>
+        <p:nvSpPr>
+          <p:cNvPr id="33" name="Rectangle: Folded Corner 32">
+            <a:extLst>
+              <a:ext uri="{FF2B5EF4-FFF2-40B4-BE49-F238E27FC236}">
+                <a16:creationId xmlns:a16="http://schemas.microsoft.com/office/drawing/2014/main" id="{2C03CB91-7B8B-49DC-B9C8-AB8EB62F73E6}"/>
+              </a:ext>
+            </a:extLst>
+          </p:cNvPr>
+          <p:cNvSpPr/>
+          <p:nvPr/>
+        </p:nvSpPr>
+        <p:spPr>
+          <a:xfrm>
+            <a:off x="6882028" y="3828312"/>
+            <a:ext cx="1728192" cy="905045"/>
+          </a:xfrm>
+          <a:prstGeom prst="foldedCorner">
+            <a:avLst>
+              <a:gd name="adj" fmla="val 16116"/>
+            </a:avLst>
+          </a:prstGeom>
+          <a:solidFill>
+            <a:schemeClr val="accent3">
+              <a:lumMod val="20000"/>
+              <a:lumOff val="80000"/>
+            </a:schemeClr>
+          </a:solidFill>
+          <a:ln>
+            <a:solidFill>
+              <a:schemeClr val="tx1"/>
+            </a:solidFill>
+          </a:ln>
+        </p:spPr>
+        <p:style>
+          <a:lnRef idx="0">
+            <a:schemeClr val="accent1"/>
+          </a:lnRef>
+          <a:fillRef idx="1">
+            <a:schemeClr val="accent1"/>
+          </a:fillRef>
+          <a:effectRef idx="0">
+            <a:schemeClr val="accent1"/>
+          </a:effectRef>
+          <a:fontRef idx="minor">
+            <a:schemeClr val="lt1"/>
+          </a:fontRef>
+        </p:style>
+        <p:txBody>
+          <a:bodyPr rot="0" spcFirstLastPara="0" vertOverflow="overflow" horzOverflow="overflow" vert="horz" wrap="square" lIns="91440" tIns="108000" rIns="91440" bIns="0" numCol="1" spcCol="0" rtlCol="0" fromWordArt="0" anchor="ctr" anchorCtr="0" forceAA="0" compatLnSpc="1">
+            <a:prstTxWarp prst="textNoShape">
+              <a:avLst/>
+            </a:prstTxWarp>
+            <a:noAutofit/>
+          </a:bodyPr>
+          <a:lstStyle/>
+          <a:p>
+            <a:pPr algn="ctr"/>
+            <a:r>
+              <a:rPr lang="en-GB" sz="1800" dirty="0">
+                <a:solidFill>
+                  <a:schemeClr val="tx1"/>
+                </a:solidFill>
+              </a:rPr>
+              <a:t>Bring new platform use cases</a:t>
+            </a:r>
+          </a:p>
+        </p:txBody>
+      </p:sp>
+      <p:sp>
+        <p:nvSpPr>
+          <p:cNvPr id="34" name="Rectangle: Folded Corner 33">
+            <a:extLst>
+              <a:ext uri="{FF2B5EF4-FFF2-40B4-BE49-F238E27FC236}">
+                <a16:creationId xmlns:a16="http://schemas.microsoft.com/office/drawing/2014/main" id="{750445D6-D962-46E6-A569-F31547439D04}"/>
+              </a:ext>
+            </a:extLst>
+          </p:cNvPr>
+          <p:cNvSpPr/>
+          <p:nvPr/>
+        </p:nvSpPr>
+        <p:spPr>
+          <a:xfrm>
+            <a:off x="6251106" y="4446951"/>
+            <a:ext cx="1100098" cy="649539"/>
+          </a:xfrm>
+          <a:prstGeom prst="foldedCorner">
+            <a:avLst>
+              <a:gd name="adj" fmla="val 16116"/>
+            </a:avLst>
+          </a:prstGeom>
+          <a:solidFill>
+            <a:schemeClr val="accent3">
+              <a:lumMod val="20000"/>
+              <a:lumOff val="80000"/>
+            </a:schemeClr>
+          </a:solidFill>
+          <a:ln>
+            <a:solidFill>
+              <a:schemeClr val="tx1"/>
+            </a:solidFill>
+          </a:ln>
+        </p:spPr>
+        <p:style>
+          <a:lnRef idx="0">
+            <a:schemeClr val="accent1"/>
+          </a:lnRef>
+          <a:fillRef idx="1">
+            <a:schemeClr val="accent1"/>
+          </a:fillRef>
+          <a:effectRef idx="0">
+            <a:schemeClr val="accent1"/>
+          </a:effectRef>
+          <a:fontRef idx="minor">
+            <a:schemeClr val="lt1"/>
+          </a:fontRef>
+        </p:style>
+        <p:txBody>
+          <a:bodyPr rot="0" spcFirstLastPara="0" vertOverflow="overflow" horzOverflow="overflow" vert="horz" wrap="square" lIns="91440" tIns="108000" rIns="91440" bIns="0" numCol="1" spcCol="0" rtlCol="0" fromWordArt="0" anchor="ctr" anchorCtr="0" forceAA="0" compatLnSpc="1">
+            <a:prstTxWarp prst="textNoShape">
+              <a:avLst/>
+            </a:prstTxWarp>
+            <a:noAutofit/>
+          </a:bodyPr>
+          <a:lstStyle/>
+          <a:p>
+            <a:pPr algn="ctr"/>
+            <a:r>
+              <a:rPr lang="en-GB" sz="1400" dirty="0">
+                <a:solidFill>
+                  <a:schemeClr val="tx1"/>
+                </a:solidFill>
+              </a:rPr>
+              <a:t>Have existing datasets</a:t>
+            </a:r>
+          </a:p>
+        </p:txBody>
+      </p:sp>
+      <p:sp>
+        <p:nvSpPr>
+          <p:cNvPr id="35" name="Rectangle: Folded Corner 34">
+            <a:extLst>
+              <a:ext uri="{FF2B5EF4-FFF2-40B4-BE49-F238E27FC236}">
+                <a16:creationId xmlns:a16="http://schemas.microsoft.com/office/drawing/2014/main" id="{92278AB6-94F9-4AF2-8EFF-B492CC67B4BE}"/>
+              </a:ext>
+            </a:extLst>
+          </p:cNvPr>
+          <p:cNvSpPr/>
+          <p:nvPr/>
+        </p:nvSpPr>
+        <p:spPr>
+          <a:xfrm>
+            <a:off x="273900" y="1800055"/>
+            <a:ext cx="1333783" cy="391838"/>
+          </a:xfrm>
+          <a:prstGeom prst="foldedCorner">
+            <a:avLst>
+              <a:gd name="adj" fmla="val 16116"/>
+            </a:avLst>
+          </a:prstGeom>
+          <a:solidFill>
+            <a:schemeClr val="accent3">
+              <a:lumMod val="20000"/>
+              <a:lumOff val="80000"/>
+            </a:schemeClr>
+          </a:solidFill>
+          <a:ln>
+            <a:solidFill>
+              <a:schemeClr val="tx1"/>
+            </a:solidFill>
+          </a:ln>
+        </p:spPr>
+        <p:style>
+          <a:lnRef idx="0">
+            <a:schemeClr val="accent1"/>
+          </a:lnRef>
+          <a:fillRef idx="1">
+            <a:schemeClr val="accent1"/>
+          </a:fillRef>
+          <a:effectRef idx="0">
+            <a:schemeClr val="accent1"/>
+          </a:effectRef>
+          <a:fontRef idx="minor">
+            <a:schemeClr val="lt1"/>
+          </a:fontRef>
+        </p:style>
+        <p:txBody>
+          <a:bodyPr rot="0" spcFirstLastPara="0" vertOverflow="overflow" horzOverflow="overflow" vert="horz" wrap="square" lIns="91440" tIns="108000" rIns="91440" bIns="0" numCol="1" spcCol="0" rtlCol="0" fromWordArt="0" anchor="ctr" anchorCtr="0" forceAA="0" compatLnSpc="1">
+            <a:prstTxWarp prst="textNoShape">
+              <a:avLst/>
+            </a:prstTxWarp>
+            <a:noAutofit/>
+          </a:bodyPr>
+          <a:lstStyle/>
+          <a:p>
+            <a:pPr algn="ctr"/>
+            <a:r>
+              <a:rPr lang="en-GB" sz="1800" dirty="0">
+                <a:solidFill>
+                  <a:schemeClr val="tx1"/>
+                </a:solidFill>
+              </a:rPr>
+              <a:t>ideas</a:t>
             </a:r>
           </a:p>
         </p:txBody>
@@ -34863,7 +35022,7 @@
                   <a:schemeClr val="tx1"/>
                 </a:solidFill>
               </a:rPr>
-              <a:t>Increased visibility</a:t>
+              <a:t>Increased brand visibility</a:t>
             </a:r>
           </a:p>
         </p:txBody>
@@ -35434,7 +35593,7 @@
         </p:nvSpPr>
         <p:spPr>
           <a:xfrm>
-            <a:off x="6858588" y="3753848"/>
+            <a:off x="7306312" y="3281684"/>
             <a:ext cx="1728192" cy="905045"/>
           </a:xfrm>
           <a:prstGeom prst="foldedCorner">
@@ -35484,7 +35643,7 @@
                   <a:schemeClr val="tx1"/>
                 </a:solidFill>
               </a:rPr>
-              <a:t>channel</a:t>
+              <a:t>Access to a new channel</a:t>
             </a:r>
           </a:p>
         </p:txBody>
@@ -35554,6 +35713,213 @@
                 </a:solidFill>
               </a:rPr>
               <a:t>Access to new markets</a:t>
+            </a:r>
+          </a:p>
+        </p:txBody>
+      </p:sp>
+      <p:sp>
+        <p:nvSpPr>
+          <p:cNvPr id="21" name="Rectangle: Folded Corner 20">
+            <a:extLst>
+              <a:ext uri="{FF2B5EF4-FFF2-40B4-BE49-F238E27FC236}">
+                <a16:creationId xmlns:a16="http://schemas.microsoft.com/office/drawing/2014/main" id="{3993AAF0-E148-411E-9080-A913EED51D2D}"/>
+              </a:ext>
+            </a:extLst>
+          </p:cNvPr>
+          <p:cNvSpPr/>
+          <p:nvPr/>
+        </p:nvSpPr>
+        <p:spPr>
+          <a:xfrm>
+            <a:off x="6085789" y="4343037"/>
+            <a:ext cx="1583045" cy="905045"/>
+          </a:xfrm>
+          <a:prstGeom prst="foldedCorner">
+            <a:avLst>
+              <a:gd name="adj" fmla="val 16116"/>
+            </a:avLst>
+          </a:prstGeom>
+          <a:solidFill>
+            <a:schemeClr val="accent3">
+              <a:lumMod val="20000"/>
+              <a:lumOff val="80000"/>
+            </a:schemeClr>
+          </a:solidFill>
+          <a:ln>
+            <a:solidFill>
+              <a:schemeClr val="tx1"/>
+            </a:solidFill>
+          </a:ln>
+        </p:spPr>
+        <p:style>
+          <a:lnRef idx="0">
+            <a:schemeClr val="accent1"/>
+          </a:lnRef>
+          <a:fillRef idx="1">
+            <a:schemeClr val="accent1"/>
+          </a:fillRef>
+          <a:effectRef idx="0">
+            <a:schemeClr val="accent1"/>
+          </a:effectRef>
+          <a:fontRef idx="minor">
+            <a:schemeClr val="lt1"/>
+          </a:fontRef>
+        </p:style>
+        <p:txBody>
+          <a:bodyPr rot="0" spcFirstLastPara="0" vertOverflow="overflow" horzOverflow="overflow" vert="horz" wrap="square" lIns="91440" tIns="108000" rIns="91440" bIns="0" numCol="1" spcCol="0" rtlCol="0" fromWordArt="0" anchor="ctr" anchorCtr="0" forceAA="0" compatLnSpc="1">
+            <a:prstTxWarp prst="textNoShape">
+              <a:avLst/>
+            </a:prstTxWarp>
+            <a:noAutofit/>
+          </a:bodyPr>
+          <a:lstStyle/>
+          <a:p>
+            <a:pPr algn="ctr"/>
+            <a:r>
+              <a:rPr lang="en-GB" sz="1200" dirty="0">
+                <a:solidFill>
+                  <a:schemeClr val="tx1"/>
+                </a:solidFill>
+              </a:rPr>
+              <a:t>Model industry and technology trends</a:t>
+            </a:r>
+          </a:p>
+        </p:txBody>
+      </p:sp>
+      <p:sp>
+        <p:nvSpPr>
+          <p:cNvPr id="22" name="Rectangle: Folded Corner 21">
+            <a:extLst>
+              <a:ext uri="{FF2B5EF4-FFF2-40B4-BE49-F238E27FC236}">
+                <a16:creationId xmlns:a16="http://schemas.microsoft.com/office/drawing/2014/main" id="{66963F38-50F8-40EC-B8CB-B3D1AE9707FF}"/>
+              </a:ext>
+            </a:extLst>
+          </p:cNvPr>
+          <p:cNvSpPr/>
+          <p:nvPr/>
+        </p:nvSpPr>
+        <p:spPr>
+          <a:xfrm>
+            <a:off x="7166354" y="5376553"/>
+            <a:ext cx="1583045" cy="905045"/>
+          </a:xfrm>
+          <a:prstGeom prst="foldedCorner">
+            <a:avLst>
+              <a:gd name="adj" fmla="val 16116"/>
+            </a:avLst>
+          </a:prstGeom>
+          <a:solidFill>
+            <a:schemeClr val="accent3">
+              <a:lumMod val="20000"/>
+              <a:lumOff val="80000"/>
+            </a:schemeClr>
+          </a:solidFill>
+          <a:ln>
+            <a:solidFill>
+              <a:schemeClr val="tx1"/>
+            </a:solidFill>
+          </a:ln>
+        </p:spPr>
+        <p:style>
+          <a:lnRef idx="0">
+            <a:schemeClr val="accent1"/>
+          </a:lnRef>
+          <a:fillRef idx="1">
+            <a:schemeClr val="accent1"/>
+          </a:fillRef>
+          <a:effectRef idx="0">
+            <a:schemeClr val="accent1"/>
+          </a:effectRef>
+          <a:fontRef idx="minor">
+            <a:schemeClr val="lt1"/>
+          </a:fontRef>
+        </p:style>
+        <p:txBody>
+          <a:bodyPr rot="0" spcFirstLastPara="0" vertOverflow="overflow" horzOverflow="overflow" vert="horz" wrap="square" lIns="91440" tIns="108000" rIns="91440" bIns="0" numCol="1" spcCol="0" rtlCol="0" fromWordArt="0" anchor="ctr" anchorCtr="0" forceAA="0" compatLnSpc="1">
+            <a:prstTxWarp prst="textNoShape">
+              <a:avLst/>
+            </a:prstTxWarp>
+            <a:noAutofit/>
+          </a:bodyPr>
+          <a:lstStyle/>
+          <a:p>
+            <a:pPr algn="ctr"/>
+            <a:r>
+              <a:rPr lang="en-GB" sz="1200" dirty="0">
+                <a:solidFill>
+                  <a:schemeClr val="tx1"/>
+                </a:solidFill>
+              </a:rPr>
+              <a:t>Model new and existing solutions</a:t>
+            </a:r>
+          </a:p>
+        </p:txBody>
+      </p:sp>
+      <p:sp>
+        <p:nvSpPr>
+          <p:cNvPr id="23" name="Rectangle: Folded Corner 22">
+            <a:extLst>
+              <a:ext uri="{FF2B5EF4-FFF2-40B4-BE49-F238E27FC236}">
+                <a16:creationId xmlns:a16="http://schemas.microsoft.com/office/drawing/2014/main" id="{ED64DD5C-E0DC-48E9-B4BB-CF8B61167294}"/>
+              </a:ext>
+            </a:extLst>
+          </p:cNvPr>
+          <p:cNvSpPr/>
+          <p:nvPr/>
+        </p:nvSpPr>
+        <p:spPr>
+          <a:xfrm>
+            <a:off x="1759590" y="6506475"/>
+            <a:ext cx="1595170" cy="594336"/>
+          </a:xfrm>
+          <a:prstGeom prst="foldedCorner">
+            <a:avLst>
+              <a:gd name="adj" fmla="val 16116"/>
+            </a:avLst>
+          </a:prstGeom>
+          <a:solidFill>
+            <a:schemeClr val="accent3">
+              <a:lumMod val="20000"/>
+              <a:lumOff val="80000"/>
+            </a:schemeClr>
+          </a:solidFill>
+          <a:ln>
+            <a:solidFill>
+              <a:schemeClr val="tx1"/>
+            </a:solidFill>
+          </a:ln>
+        </p:spPr>
+        <p:style>
+          <a:lnRef idx="0">
+            <a:schemeClr val="accent1"/>
+          </a:lnRef>
+          <a:fillRef idx="1">
+            <a:schemeClr val="accent1"/>
+          </a:fillRef>
+          <a:effectRef idx="0">
+            <a:schemeClr val="accent1"/>
+          </a:effectRef>
+          <a:fontRef idx="minor">
+            <a:schemeClr val="lt1"/>
+          </a:fontRef>
+        </p:style>
+        <p:txBody>
+          <a:bodyPr rot="0" spcFirstLastPara="0" vertOverflow="overflow" horzOverflow="overflow" vert="horz" wrap="square" lIns="91440" tIns="108000" rIns="91440" bIns="0" numCol="1" spcCol="0" rtlCol="0" fromWordArt="0" anchor="ctr" anchorCtr="0" forceAA="0" compatLnSpc="1">
+            <a:prstTxWarp prst="textNoShape">
+              <a:avLst/>
+            </a:prstTxWarp>
+            <a:noAutofit/>
+          </a:bodyPr>
+          <a:lstStyle/>
+          <a:p>
+            <a:pPr algn="ctr"/>
+            <a:r>
+              <a:rPr lang="en-GB" sz="1800" dirty="0">
+                <a:solidFill>
+                  <a:schemeClr val="tx1"/>
+                </a:solidFill>
+              </a:rPr>
+              <a:t>Share market insights</a:t>
             </a:r>
           </a:p>
         </p:txBody>
@@ -35782,75 +36148,6 @@
       </p:sp>
       <p:sp>
         <p:nvSpPr>
-          <p:cNvPr id="6" name="Rectangle: Folded Corner 5">
-            <a:extLst>
-              <a:ext uri="{FF2B5EF4-FFF2-40B4-BE49-F238E27FC236}">
-                <a16:creationId xmlns:a16="http://schemas.microsoft.com/office/drawing/2014/main" id="{599D3244-0900-496F-95D5-C50B9DA3A026}"/>
-              </a:ext>
-            </a:extLst>
-          </p:cNvPr>
-          <p:cNvSpPr/>
-          <p:nvPr/>
-        </p:nvSpPr>
-        <p:spPr>
-          <a:xfrm>
-            <a:off x="2392295" y="5904072"/>
-            <a:ext cx="1679065" cy="948901"/>
-          </a:xfrm>
-          <a:prstGeom prst="foldedCorner">
-            <a:avLst>
-              <a:gd name="adj" fmla="val 24011"/>
-            </a:avLst>
-          </a:prstGeom>
-          <a:solidFill>
-            <a:schemeClr val="accent3">
-              <a:lumMod val="20000"/>
-              <a:lumOff val="80000"/>
-            </a:schemeClr>
-          </a:solidFill>
-          <a:ln>
-            <a:solidFill>
-              <a:schemeClr val="tx1"/>
-            </a:solidFill>
-          </a:ln>
-        </p:spPr>
-        <p:style>
-          <a:lnRef idx="0">
-            <a:schemeClr val="accent1"/>
-          </a:lnRef>
-          <a:fillRef idx="1">
-            <a:schemeClr val="accent1"/>
-          </a:fillRef>
-          <a:effectRef idx="0">
-            <a:schemeClr val="accent1"/>
-          </a:effectRef>
-          <a:fontRef idx="minor">
-            <a:schemeClr val="lt1"/>
-          </a:fontRef>
-        </p:style>
-        <p:txBody>
-          <a:bodyPr rot="0" spcFirstLastPara="0" vertOverflow="overflow" horzOverflow="overflow" vert="horz" wrap="square" lIns="91440" tIns="108000" rIns="91440" bIns="0" numCol="1" spcCol="0" rtlCol="0" fromWordArt="0" anchor="ctr" anchorCtr="0" forceAA="0" compatLnSpc="1">
-            <a:prstTxWarp prst="textNoShape">
-              <a:avLst/>
-            </a:prstTxWarp>
-            <a:noAutofit/>
-          </a:bodyPr>
-          <a:lstStyle/>
-          <a:p>
-            <a:pPr algn="ctr"/>
-            <a:r>
-              <a:rPr lang="en-GB" sz="1800" dirty="0">
-                <a:solidFill>
-                  <a:schemeClr val="tx1"/>
-                </a:solidFill>
-              </a:rPr>
-              <a:t>Understand innovation</a:t>
-            </a:r>
-          </a:p>
-        </p:txBody>
-      </p:sp>
-      <p:sp>
-        <p:nvSpPr>
           <p:cNvPr id="8" name="Rectangle: Folded Corner 7">
             <a:extLst>
               <a:ext uri="{FF2B5EF4-FFF2-40B4-BE49-F238E27FC236}">
@@ -36397,6 +36694,351 @@
                 </a:solidFill>
               </a:rPr>
               <a:t>No clear line of sight on demand signals</a:t>
+            </a:r>
+          </a:p>
+        </p:txBody>
+      </p:sp>
+      <p:sp>
+        <p:nvSpPr>
+          <p:cNvPr id="21" name="Rectangle: Folded Corner 20">
+            <a:extLst>
+              <a:ext uri="{FF2B5EF4-FFF2-40B4-BE49-F238E27FC236}">
+                <a16:creationId xmlns:a16="http://schemas.microsoft.com/office/drawing/2014/main" id="{7954B1FE-E300-4BF4-AE6B-3A5719C447EA}"/>
+              </a:ext>
+            </a:extLst>
+          </p:cNvPr>
+          <p:cNvSpPr/>
+          <p:nvPr/>
+        </p:nvSpPr>
+        <p:spPr>
+          <a:xfrm>
+            <a:off x="6739136" y="3615693"/>
+            <a:ext cx="2016224" cy="905045"/>
+          </a:xfrm>
+          <a:prstGeom prst="foldedCorner">
+            <a:avLst>
+              <a:gd name="adj" fmla="val 16116"/>
+            </a:avLst>
+          </a:prstGeom>
+          <a:solidFill>
+            <a:schemeClr val="accent3">
+              <a:lumMod val="20000"/>
+              <a:lumOff val="80000"/>
+            </a:schemeClr>
+          </a:solidFill>
+          <a:ln>
+            <a:solidFill>
+              <a:schemeClr val="tx1"/>
+            </a:solidFill>
+          </a:ln>
+        </p:spPr>
+        <p:style>
+          <a:lnRef idx="0">
+            <a:schemeClr val="accent1"/>
+          </a:lnRef>
+          <a:fillRef idx="1">
+            <a:schemeClr val="accent1"/>
+          </a:fillRef>
+          <a:effectRef idx="0">
+            <a:schemeClr val="accent1"/>
+          </a:effectRef>
+          <a:fontRef idx="minor">
+            <a:schemeClr val="lt1"/>
+          </a:fontRef>
+        </p:style>
+        <p:txBody>
+          <a:bodyPr rot="0" spcFirstLastPara="0" vertOverflow="overflow" horzOverflow="overflow" vert="horz" wrap="square" lIns="91440" tIns="108000" rIns="91440" bIns="0" numCol="1" spcCol="0" rtlCol="0" fromWordArt="0" anchor="ctr" anchorCtr="0" forceAA="0" compatLnSpc="1">
+            <a:prstTxWarp prst="textNoShape">
+              <a:avLst/>
+            </a:prstTxWarp>
+            <a:noAutofit/>
+          </a:bodyPr>
+          <a:lstStyle/>
+          <a:p>
+            <a:pPr algn="ctr"/>
+            <a:r>
+              <a:rPr lang="en-GB" sz="1200" dirty="0">
+                <a:solidFill>
+                  <a:schemeClr val="tx1"/>
+                </a:solidFill>
+              </a:rPr>
+              <a:t>Discover new solutions and components</a:t>
+            </a:r>
+          </a:p>
+        </p:txBody>
+      </p:sp>
+      <p:sp>
+        <p:nvSpPr>
+          <p:cNvPr id="22" name="Rectangle: Folded Corner 21">
+            <a:extLst>
+              <a:ext uri="{FF2B5EF4-FFF2-40B4-BE49-F238E27FC236}">
+                <a16:creationId xmlns:a16="http://schemas.microsoft.com/office/drawing/2014/main" id="{5F44AA67-71C2-4669-AC9D-B88878889D1A}"/>
+              </a:ext>
+            </a:extLst>
+          </p:cNvPr>
+          <p:cNvSpPr/>
+          <p:nvPr/>
+        </p:nvSpPr>
+        <p:spPr>
+          <a:xfrm>
+            <a:off x="7603232" y="4858539"/>
+            <a:ext cx="1368152" cy="606085"/>
+          </a:xfrm>
+          <a:prstGeom prst="foldedCorner">
+            <a:avLst>
+              <a:gd name="adj" fmla="val 16116"/>
+            </a:avLst>
+          </a:prstGeom>
+          <a:solidFill>
+            <a:schemeClr val="accent3">
+              <a:lumMod val="20000"/>
+              <a:lumOff val="80000"/>
+            </a:schemeClr>
+          </a:solidFill>
+          <a:ln>
+            <a:solidFill>
+              <a:schemeClr val="tx1"/>
+            </a:solidFill>
+          </a:ln>
+        </p:spPr>
+        <p:style>
+          <a:lnRef idx="0">
+            <a:schemeClr val="accent1"/>
+          </a:lnRef>
+          <a:fillRef idx="1">
+            <a:schemeClr val="accent1"/>
+          </a:fillRef>
+          <a:effectRef idx="0">
+            <a:schemeClr val="accent1"/>
+          </a:effectRef>
+          <a:fontRef idx="minor">
+            <a:schemeClr val="lt1"/>
+          </a:fontRef>
+        </p:style>
+        <p:txBody>
+          <a:bodyPr rot="0" spcFirstLastPara="0" vertOverflow="overflow" horzOverflow="overflow" vert="horz" wrap="square" lIns="91440" tIns="108000" rIns="91440" bIns="0" numCol="1" spcCol="0" rtlCol="0" fromWordArt="0" anchor="ctr" anchorCtr="0" forceAA="0" compatLnSpc="1">
+            <a:prstTxWarp prst="textNoShape">
+              <a:avLst/>
+            </a:prstTxWarp>
+            <a:noAutofit/>
+          </a:bodyPr>
+          <a:lstStyle/>
+          <a:p>
+            <a:pPr algn="ctr"/>
+            <a:r>
+              <a:rPr lang="en-GB" sz="1200" dirty="0">
+                <a:solidFill>
+                  <a:schemeClr val="tx1"/>
+                </a:solidFill>
+              </a:rPr>
+              <a:t>Benchmarking</a:t>
+            </a:r>
+          </a:p>
+        </p:txBody>
+      </p:sp>
+      <p:sp>
+        <p:nvSpPr>
+          <p:cNvPr id="23" name="Rectangle: Folded Corner 22">
+            <a:extLst>
+              <a:ext uri="{FF2B5EF4-FFF2-40B4-BE49-F238E27FC236}">
+                <a16:creationId xmlns:a16="http://schemas.microsoft.com/office/drawing/2014/main" id="{E187CED8-26DC-422D-837F-D3D3329926DD}"/>
+              </a:ext>
+            </a:extLst>
+          </p:cNvPr>
+          <p:cNvSpPr/>
+          <p:nvPr/>
+        </p:nvSpPr>
+        <p:spPr>
+          <a:xfrm>
+            <a:off x="3231827" y="5598190"/>
+            <a:ext cx="1679065" cy="948901"/>
+          </a:xfrm>
+          <a:prstGeom prst="foldedCorner">
+            <a:avLst>
+              <a:gd name="adj" fmla="val 24011"/>
+            </a:avLst>
+          </a:prstGeom>
+          <a:solidFill>
+            <a:schemeClr val="accent3">
+              <a:lumMod val="20000"/>
+              <a:lumOff val="80000"/>
+            </a:schemeClr>
+          </a:solidFill>
+          <a:ln>
+            <a:solidFill>
+              <a:schemeClr val="tx1"/>
+            </a:solidFill>
+          </a:ln>
+        </p:spPr>
+        <p:style>
+          <a:lnRef idx="0">
+            <a:schemeClr val="accent1"/>
+          </a:lnRef>
+          <a:fillRef idx="1">
+            <a:schemeClr val="accent1"/>
+          </a:fillRef>
+          <a:effectRef idx="0">
+            <a:schemeClr val="accent1"/>
+          </a:effectRef>
+          <a:fontRef idx="minor">
+            <a:schemeClr val="lt1"/>
+          </a:fontRef>
+        </p:style>
+        <p:txBody>
+          <a:bodyPr rot="0" spcFirstLastPara="0" vertOverflow="overflow" horzOverflow="overflow" vert="horz" wrap="square" lIns="91440" tIns="108000" rIns="91440" bIns="0" numCol="1" spcCol="0" rtlCol="0" fromWordArt="0" anchor="ctr" anchorCtr="0" forceAA="0" compatLnSpc="1">
+            <a:prstTxWarp prst="textNoShape">
+              <a:avLst/>
+            </a:prstTxWarp>
+            <a:noAutofit/>
+          </a:bodyPr>
+          <a:lstStyle/>
+          <a:p>
+            <a:pPr algn="ctr"/>
+            <a:r>
+              <a:rPr lang="en-GB" sz="1800" dirty="0">
+                <a:solidFill>
+                  <a:schemeClr val="tx1"/>
+                </a:solidFill>
+              </a:rPr>
+              <a:t>Understand demand</a:t>
+            </a:r>
+          </a:p>
+        </p:txBody>
+      </p:sp>
+      <p:sp>
+        <p:nvSpPr>
+          <p:cNvPr id="24" name="Rectangle: Folded Corner 23">
+            <a:extLst>
+              <a:ext uri="{FF2B5EF4-FFF2-40B4-BE49-F238E27FC236}">
+                <a16:creationId xmlns:a16="http://schemas.microsoft.com/office/drawing/2014/main" id="{AD65A676-1E9E-44BB-9CCE-28570D4C2364}"/>
+              </a:ext>
+            </a:extLst>
+          </p:cNvPr>
+          <p:cNvSpPr/>
+          <p:nvPr/>
+        </p:nvSpPr>
+        <p:spPr>
+          <a:xfrm>
+            <a:off x="10051504" y="1425545"/>
+            <a:ext cx="1368152" cy="606085"/>
+          </a:xfrm>
+          <a:prstGeom prst="foldedCorner">
+            <a:avLst>
+              <a:gd name="adj" fmla="val 16116"/>
+            </a:avLst>
+          </a:prstGeom>
+          <a:solidFill>
+            <a:schemeClr val="accent3">
+              <a:lumMod val="20000"/>
+              <a:lumOff val="80000"/>
+            </a:schemeClr>
+          </a:solidFill>
+          <a:ln>
+            <a:solidFill>
+              <a:schemeClr val="tx1"/>
+            </a:solidFill>
+          </a:ln>
+        </p:spPr>
+        <p:style>
+          <a:lnRef idx="0">
+            <a:schemeClr val="accent1"/>
+          </a:lnRef>
+          <a:fillRef idx="1">
+            <a:schemeClr val="accent1"/>
+          </a:fillRef>
+          <a:effectRef idx="0">
+            <a:schemeClr val="accent1"/>
+          </a:effectRef>
+          <a:fontRef idx="minor">
+            <a:schemeClr val="lt1"/>
+          </a:fontRef>
+        </p:style>
+        <p:txBody>
+          <a:bodyPr rot="0" spcFirstLastPara="0" vertOverflow="overflow" horzOverflow="overflow" vert="horz" wrap="square" lIns="91440" tIns="108000" rIns="91440" bIns="0" numCol="1" spcCol="0" rtlCol="0" fromWordArt="0" anchor="ctr" anchorCtr="0" forceAA="0" compatLnSpc="1">
+            <a:prstTxWarp prst="textNoShape">
+              <a:avLst/>
+            </a:prstTxWarp>
+            <a:noAutofit/>
+          </a:bodyPr>
+          <a:lstStyle/>
+          <a:p>
+            <a:pPr algn="ctr"/>
+            <a:r>
+              <a:rPr lang="en-GB" sz="1200" dirty="0">
+                <a:solidFill>
+                  <a:schemeClr val="tx1"/>
+                </a:solidFill>
+              </a:rPr>
+              <a:t>Information access</a:t>
+            </a:r>
+          </a:p>
+        </p:txBody>
+      </p:sp>
+      <p:sp>
+        <p:nvSpPr>
+          <p:cNvPr id="25" name="Rectangle: Folded Corner 24">
+            <a:extLst>
+              <a:ext uri="{FF2B5EF4-FFF2-40B4-BE49-F238E27FC236}">
+                <a16:creationId xmlns:a16="http://schemas.microsoft.com/office/drawing/2014/main" id="{6A9D518C-398B-4059-A2AF-2509B3C35B06}"/>
+              </a:ext>
+            </a:extLst>
+          </p:cNvPr>
+          <p:cNvSpPr/>
+          <p:nvPr/>
+        </p:nvSpPr>
+        <p:spPr>
+          <a:xfrm>
+            <a:off x="711754" y="4542340"/>
+            <a:ext cx="1679065" cy="430888"/>
+          </a:xfrm>
+          <a:prstGeom prst="foldedCorner">
+            <a:avLst>
+              <a:gd name="adj" fmla="val 24011"/>
+            </a:avLst>
+          </a:prstGeom>
+          <a:solidFill>
+            <a:schemeClr val="accent3">
+              <a:lumMod val="20000"/>
+              <a:lumOff val="80000"/>
+            </a:schemeClr>
+          </a:solidFill>
+          <a:ln>
+            <a:solidFill>
+              <a:schemeClr val="tx1"/>
+            </a:solidFill>
+          </a:ln>
+        </p:spPr>
+        <p:style>
+          <a:lnRef idx="0">
+            <a:schemeClr val="accent1"/>
+          </a:lnRef>
+          <a:fillRef idx="1">
+            <a:schemeClr val="accent1"/>
+          </a:fillRef>
+          <a:effectRef idx="0">
+            <a:schemeClr val="accent1"/>
+          </a:effectRef>
+          <a:fontRef idx="minor">
+            <a:schemeClr val="lt1"/>
+          </a:fontRef>
+        </p:style>
+        <p:txBody>
+          <a:bodyPr rot="0" spcFirstLastPara="0" vertOverflow="overflow" horzOverflow="overflow" vert="horz" wrap="square" lIns="91440" tIns="108000" rIns="91440" bIns="0" numCol="1" spcCol="0" rtlCol="0" fromWordArt="0" anchor="ctr" anchorCtr="0" forceAA="0" compatLnSpc="1">
+            <a:prstTxWarp prst="textNoShape">
+              <a:avLst/>
+            </a:prstTxWarp>
+            <a:noAutofit/>
+          </a:bodyPr>
+          <a:lstStyle/>
+          <a:p>
+            <a:pPr algn="ctr"/>
+            <a:r>
+              <a:rPr lang="en-GB" sz="1800" dirty="0">
+                <a:solidFill>
+                  <a:schemeClr val="tx1"/>
+                </a:solidFill>
+              </a:rPr>
+              <a:t>channel</a:t>
             </a:r>
           </a:p>
         </p:txBody>

</xml_diff>